<commit_message>
update sample PPTX output
</commit_message>
<xml_diff>
--- a/sample.pptx
+++ b/sample.pptx
@@ -1042,7 +1042,7 @@
       </p:grpSpPr>
       <p:pic>
         <p:nvPicPr>
-          <p:cNvPr id="2" name="Object 1" descr="/tmp/tmp-68968g1w9oNqzlKum/canvas.png">    </p:cNvPr>
+          <p:cNvPr id="2" name="Object 1" descr="/tmp/tmp-707356tAz0QeWluN8/canvas.png">    </p:cNvPr>
           <p:cNvPicPr>
             <a:picLocks noChangeAspect="1"/>
           </p:cNvPicPr>
@@ -1369,7 +1369,7 @@
       </p:grpSpPr>
       <p:pic>
         <p:nvPicPr>
-          <p:cNvPr id="2" name="Object 1" descr="/tmp/tmp-68968g1w9oNqzlKum/slide-1.png">    </p:cNvPr>
+          <p:cNvPr id="2" name="Object 1" descr="/tmp/tmp-707356tAz0QeWluN8/slide-1.png">    </p:cNvPr>
           <p:cNvPicPr>
             <a:picLocks noChangeAspect="1"/>
           </p:cNvPicPr>
@@ -1430,7 +1430,7 @@
       </p:grpSpPr>
       <p:pic>
         <p:nvPicPr>
-          <p:cNvPr id="2" name="Object 1" descr="/tmp/tmp-68968g1w9oNqzlKum/slide-2.png">    </p:cNvPr>
+          <p:cNvPr id="2" name="Object 1" descr="/tmp/tmp-707356tAz0QeWluN8/slide-2.png">    </p:cNvPr>
           <p:cNvPicPr>
             <a:picLocks noChangeAspect="1"/>
           </p:cNvPicPr>
@@ -1491,7 +1491,7 @@
       </p:grpSpPr>
       <p:pic>
         <p:nvPicPr>
-          <p:cNvPr id="2" name="Object 1" descr="/tmp/tmp-68968g1w9oNqzlKum/slide-3.png">    </p:cNvPr>
+          <p:cNvPr id="2" name="Object 1" descr="/tmp/tmp-707356tAz0QeWluN8/slide-3.png">    </p:cNvPr>
           <p:cNvPicPr>
             <a:picLocks noChangeAspect="1"/>
           </p:cNvPicPr>
@@ -1552,7 +1552,7 @@
       </p:grpSpPr>
       <p:pic>
         <p:nvPicPr>
-          <p:cNvPr id="2" name="Object 1" descr="/tmp/tmp-68968g1w9oNqzlKum/slide-4.png">    </p:cNvPr>
+          <p:cNvPr id="2" name="Object 1" descr="/tmp/tmp-707356tAz0QeWluN8/slide-4.png">    </p:cNvPr>
           <p:cNvPicPr>
             <a:picLocks noChangeAspect="1"/>
           </p:cNvPicPr>
@@ -1613,7 +1613,7 @@
       </p:grpSpPr>
       <p:pic>
         <p:nvPicPr>
-          <p:cNvPr id="2" name="Object 1" descr="/tmp/tmp-68968g1w9oNqzlKum/slide-5.png">    </p:cNvPr>
+          <p:cNvPr id="2" name="Object 1" descr="/tmp/tmp-707356tAz0QeWluN8/slide-5.png">    </p:cNvPr>
           <p:cNvPicPr>
             <a:picLocks noChangeAspect="1"/>
           </p:cNvPicPr>
@@ -1674,7 +1674,7 @@
       </p:grpSpPr>
       <p:pic>
         <p:nvPicPr>
-          <p:cNvPr id="2" name="Object 1" descr="/tmp/tmp-68968g1w9oNqzlKum/slide-6.png">    </p:cNvPr>
+          <p:cNvPr id="2" name="Object 1" descr="/tmp/tmp-707356tAz0QeWluN8/slide-6.png">    </p:cNvPr>
           <p:cNvPicPr>
             <a:picLocks noChangeAspect="1"/>
           </p:cNvPicPr>

</xml_diff>